<commit_message>
Update pptx added flowchar(re)
</commit_message>
<xml_diff>
--- a/발표자료ver3.pptx
+++ b/발표자료ver3.pptx
@@ -15921,24 +15921,12 @@
             </a:pPr>
             <a:r>
               <a:rPr lang="en-US" altLang="ko-KR" sz="1200" b="1" strike="noStrike" cap="none" dirty="0" smtClean="0">
-                <a:solidFill>
-                  <a:schemeClr val="tx1">
-                    <a:lumMod val="65000"/>
-                    <a:lumOff val="35000"/>
-                  </a:schemeClr>
-                </a:solidFill>
                 <a:latin typeface="맑은 고딕" charset="0"/>
                 <a:ea typeface="맑은 고딕" charset="0"/>
               </a:rPr>
               <a:t>1. What program</a:t>
             </a:r>
             <a:endParaRPr lang="ko-KR" altLang="en-US" sz="1200" b="1" strike="noStrike" cap="none" dirty="0" smtClean="0">
-              <a:solidFill>
-                <a:schemeClr val="tx1">
-                  <a:lumMod val="65000"/>
-                  <a:lumOff val="35000"/>
-                </a:schemeClr>
-              </a:solidFill>
               <a:latin typeface="맑은 고딕" charset="0"/>
               <a:ea typeface="맑은 고딕" charset="0"/>
             </a:endParaRPr>
@@ -15959,24 +15947,12 @@
             </a:pPr>
             <a:r>
               <a:rPr lang="en-US" altLang="ko-KR" sz="1200" b="0" strike="noStrike" cap="none" dirty="0" smtClean="0">
-                <a:solidFill>
-                  <a:schemeClr val="tx1">
-                    <a:lumMod val="65000"/>
-                    <a:lumOff val="35000"/>
-                  </a:schemeClr>
-                </a:solidFill>
                 <a:latin typeface="맑은 고딕" charset="0"/>
                 <a:ea typeface="맑은 고딕" charset="0"/>
               </a:rPr>
               <a:t>프로그램 선정 계기 및 이유</a:t>
             </a:r>
             <a:endParaRPr lang="ko-KR" altLang="en-US" sz="1200" b="0" strike="noStrike" cap="none" dirty="0" smtClean="0">
-              <a:solidFill>
-                <a:schemeClr val="tx1">
-                  <a:lumMod val="65000"/>
-                  <a:lumOff val="35000"/>
-                </a:schemeClr>
-              </a:solidFill>
               <a:latin typeface="맑은 고딕" charset="0"/>
               <a:ea typeface="맑은 고딕" charset="0"/>
             </a:endParaRPr>
@@ -16046,24 +16022,12 @@
             </a:pPr>
             <a:r>
               <a:rPr lang="en-US" altLang="ko-KR" sz="1200" b="1" strike="noStrike" cap="none" dirty="0" smtClean="0">
-                <a:solidFill>
-                  <a:schemeClr val="tx1">
-                    <a:lumMod val="65000"/>
-                    <a:lumOff val="35000"/>
-                  </a:schemeClr>
-                </a:solidFill>
                 <a:latin typeface="맑은 고딕" charset="0"/>
                 <a:ea typeface="맑은 고딕" charset="0"/>
               </a:rPr>
               <a:t>2. How implement</a:t>
             </a:r>
             <a:endParaRPr lang="ko-KR" altLang="en-US" sz="1200" b="1" strike="noStrike" cap="none" dirty="0" smtClean="0">
-              <a:solidFill>
-                <a:schemeClr val="tx1">
-                  <a:lumMod val="65000"/>
-                  <a:lumOff val="35000"/>
-                </a:schemeClr>
-              </a:solidFill>
               <a:latin typeface="맑은 고딕" charset="0"/>
               <a:ea typeface="맑은 고딕" charset="0"/>
             </a:endParaRPr>
@@ -16083,25 +16047,34 @@
               <a:buNone/>
             </a:pPr>
             <a:r>
-              <a:rPr lang="en-US" altLang="ko-KR" sz="1200" b="0" strike="noStrike" cap="none" dirty="0" smtClean="0">
-                <a:solidFill>
-                  <a:schemeClr val="tx1">
-                    <a:lumMod val="65000"/>
-                    <a:lumOff val="35000"/>
-                  </a:schemeClr>
-                </a:solidFill>
+              <a:rPr lang="en-US" altLang="ko-KR" sz="1200" b="0" strike="noStrike" cap="none" dirty="0" err="1" smtClean="0">
                 <a:latin typeface="맑은 고딕" charset="0"/>
                 <a:ea typeface="맑은 고딕" charset="0"/>
               </a:rPr>
-              <a:t>구현 설명</a:t>
+              <a:t>구현</a:t>
+            </a:r>
+            <a:r>
+              <a:rPr lang="en-US" altLang="ko-KR" sz="1200" b="0" strike="noStrike" cap="none" dirty="0" smtClean="0">
+                <a:latin typeface="맑은 고딕" charset="0"/>
+                <a:ea typeface="맑은 고딕" charset="0"/>
+              </a:rPr>
+              <a:t> </a:t>
+            </a:r>
+            <a:r>
+              <a:rPr lang="ko-KR" altLang="en-US" sz="1200" dirty="0" smtClean="0">
+                <a:latin typeface="맑은 고딕" charset="0"/>
+                <a:ea typeface="맑은 고딕" charset="0"/>
+              </a:rPr>
+              <a:t>방식 및 실행 순서 설</a:t>
+            </a:r>
+            <a:r>
+              <a:rPr lang="ko-KR" altLang="en-US" sz="1200" dirty="0">
+                <a:latin typeface="맑은 고딕" charset="0"/>
+                <a:ea typeface="맑은 고딕" charset="0"/>
+              </a:rPr>
+              <a:t>명</a:t>
             </a:r>
             <a:endParaRPr lang="ko-KR" altLang="en-US" sz="1200" b="0" strike="noStrike" cap="none" dirty="0" smtClean="0">
-              <a:solidFill>
-                <a:schemeClr val="tx1">
-                  <a:lumMod val="65000"/>
-                  <a:lumOff val="35000"/>
-                </a:schemeClr>
-              </a:solidFill>
               <a:latin typeface="맑은 고딕" charset="0"/>
               <a:ea typeface="맑은 고딕" charset="0"/>
             </a:endParaRPr>
@@ -16171,24 +16144,12 @@
             </a:pPr>
             <a:r>
               <a:rPr lang="en-US" altLang="ko-KR" sz="1200" b="1" strike="noStrike" cap="none" dirty="0" smtClean="0">
-                <a:solidFill>
-                  <a:schemeClr val="tx1">
-                    <a:lumMod val="65000"/>
-                    <a:lumOff val="35000"/>
-                  </a:schemeClr>
-                </a:solidFill>
                 <a:latin typeface="맑은 고딕" charset="0"/>
                 <a:ea typeface="맑은 고딕" charset="0"/>
               </a:rPr>
               <a:t>3. Demo play</a:t>
             </a:r>
             <a:endParaRPr lang="ko-KR" altLang="en-US" sz="1200" b="1" strike="noStrike" cap="none" dirty="0" smtClean="0">
-              <a:solidFill>
-                <a:schemeClr val="tx1">
-                  <a:lumMod val="65000"/>
-                  <a:lumOff val="35000"/>
-                </a:schemeClr>
-              </a:solidFill>
               <a:latin typeface="맑은 고딕" charset="0"/>
               <a:ea typeface="맑은 고딕" charset="0"/>
             </a:endParaRPr>
@@ -16209,24 +16170,12 @@
             </a:pPr>
             <a:r>
               <a:rPr lang="en-US" altLang="ko-KR" sz="1200" b="0" strike="noStrike" cap="none" dirty="0" smtClean="0">
-                <a:solidFill>
-                  <a:schemeClr val="tx1">
-                    <a:lumMod val="65000"/>
-                    <a:lumOff val="35000"/>
-                  </a:schemeClr>
-                </a:solidFill>
                 <a:latin typeface="맑은 고딕" charset="0"/>
                 <a:ea typeface="맑은 고딕" charset="0"/>
               </a:rPr>
               <a:t>동영상을 통한 프로그램 시연</a:t>
             </a:r>
             <a:endParaRPr lang="ko-KR" altLang="en-US" sz="1200" b="0" strike="noStrike" cap="none" dirty="0" smtClean="0">
-              <a:solidFill>
-                <a:schemeClr val="tx1">
-                  <a:lumMod val="65000"/>
-                  <a:lumOff val="35000"/>
-                </a:schemeClr>
-              </a:solidFill>
               <a:latin typeface="맑은 고딕" charset="0"/>
               <a:ea typeface="맑은 고딕" charset="0"/>
             </a:endParaRPr>
@@ -24116,7 +24065,7 @@
         </p:nvSpPr>
         <p:spPr>
           <a:xfrm>
-            <a:off x="7672588" y="3850237"/>
+            <a:off x="7643061" y="3987165"/>
             <a:ext cx="1794510" cy="370840"/>
           </a:xfrm>
           <a:prstGeom prst="rect">
@@ -24171,8 +24120,8 @@
         </p:nvSpPr>
         <p:spPr>
           <a:xfrm>
-            <a:off x="8907462" y="3749127"/>
-            <a:ext cx="2834373" cy="647613"/>
+            <a:off x="9079665" y="3886835"/>
+            <a:ext cx="1788862" cy="647613"/>
           </a:xfrm>
           <a:prstGeom prst="rect">
             <a:avLst/>
@@ -24242,6 +24191,42 @@
           </a:p>
         </p:txBody>
       </p:sp>
+      <p:pic>
+        <p:nvPicPr>
+          <p:cNvPr id="1026" name="Picture 2" descr="C:\Users\김경래\Downloads\SysProgTeamProject-master (1)\SysProgTeamProject-master\flow chart.png"/>
+          <p:cNvPicPr>
+            <a:picLocks noChangeAspect="1" noChangeArrowheads="1"/>
+          </p:cNvPicPr>
+          <p:nvPr/>
+        </p:nvPicPr>
+        <p:blipFill>
+          <a:blip r:embed="rId2">
+            <a:extLst>
+              <a:ext uri="{28A0092B-C50C-407E-A947-70E740481C1C}">
+                <a14:useLocalDpi xmlns:a14="http://schemas.microsoft.com/office/drawing/2010/main" val="0"/>
+              </a:ext>
+            </a:extLst>
+          </a:blip>
+          <a:srcRect/>
+          <a:stretch>
+            <a:fillRect/>
+          </a:stretch>
+        </p:blipFill>
+        <p:spPr bwMode="auto">
+          <a:xfrm>
+            <a:off x="3125336" y="1783557"/>
+            <a:ext cx="5492316" cy="4553266"/>
+          </a:xfrm>
+          <a:prstGeom prst="rect">
+            <a:avLst/>
+          </a:prstGeom>
+          <a:solidFill>
+            <a:schemeClr val="bg1">
+              <a:lumMod val="95000"/>
+            </a:schemeClr>
+          </a:solidFill>
+        </p:spPr>
+      </p:pic>
     </p:spTree>
   </p:cSld>
   <p:clrMapOvr>
@@ -24832,30 +24817,21 @@
                             </p:childTnLst>
                           </p:cTn>
                         </p:par>
-                      </p:childTnLst>
-                    </p:cTn>
-                  </p:par>
-                  <p:par>
-                    <p:cTn id="53" fill="hold">
-                      <p:stCondLst>
-                        <p:cond delay="indefinite"/>
-                      </p:stCondLst>
-                      <p:childTnLst>
                         <p:par>
-                          <p:cTn id="54" fill="hold">
+                          <p:cTn id="53" fill="hold">
                             <p:stCondLst>
-                              <p:cond delay="0"/>
+                              <p:cond delay="4000"/>
                             </p:stCondLst>
                             <p:childTnLst>
                               <p:par>
-                                <p:cTn id="55" presetID="1" presetClass="entr" presetSubtype="0" fill="hold" grpId="0" nodeType="clickEffect">
+                                <p:cTn id="54" presetID="1" presetClass="entr" presetSubtype="0" fill="hold" grpId="0" nodeType="afterEffect">
                                   <p:stCondLst>
                                     <p:cond delay="0"/>
                                   </p:stCondLst>
                                   <p:childTnLst>
                                     <p:set>
                                       <p:cBhvr>
-                                        <p:cTn id="56" dur="1" fill="hold">
+                                        <p:cTn id="55" dur="1" fill="hold">
                                           <p:stCondLst>
                                             <p:cond delay="0"/>
                                           </p:stCondLst>
@@ -24875,14 +24851,14 @@
                                 </p:cTn>
                               </p:par>
                               <p:par>
-                                <p:cTn id="57" presetID="1" presetClass="entr" presetSubtype="0" fill="hold" grpId="0" nodeType="withEffect">
+                                <p:cTn id="56" presetID="1" presetClass="entr" presetSubtype="0" fill="hold" grpId="0" nodeType="withEffect">
                                   <p:stCondLst>
                                     <p:cond delay="0"/>
                                   </p:stCondLst>
                                   <p:childTnLst>
                                     <p:set>
                                       <p:cBhvr>
-                                        <p:cTn id="58" dur="1" fill="hold">
+                                        <p:cTn id="57" dur="1" fill="hold">
                                           <p:stCondLst>
                                             <p:cond delay="0"/>
                                           </p:stCondLst>
@@ -24904,30 +24880,21 @@
                             </p:childTnLst>
                           </p:cTn>
                         </p:par>
-                      </p:childTnLst>
-                    </p:cTn>
-                  </p:par>
-                  <p:par>
-                    <p:cTn id="59" fill="hold">
-                      <p:stCondLst>
-                        <p:cond delay="indefinite"/>
-                      </p:stCondLst>
-                      <p:childTnLst>
                         <p:par>
-                          <p:cTn id="60" fill="hold">
+                          <p:cTn id="58" fill="hold">
                             <p:stCondLst>
-                              <p:cond delay="0"/>
+                              <p:cond delay="4000"/>
                             </p:stCondLst>
                             <p:childTnLst>
                               <p:par>
-                                <p:cTn id="61" presetID="1" presetClass="entr" presetSubtype="0" fill="hold" grpId="0" nodeType="clickEffect">
+                                <p:cTn id="59" presetID="1" presetClass="entr" presetSubtype="0" fill="hold" grpId="0" nodeType="afterEffect">
                                   <p:stCondLst>
                                     <p:cond delay="0"/>
                                   </p:stCondLst>
                                   <p:childTnLst>
                                     <p:set>
                                       <p:cBhvr>
-                                        <p:cTn id="62" dur="1" fill="hold">
+                                        <p:cTn id="60" dur="1" fill="hold">
                                           <p:stCondLst>
                                             <p:cond delay="0"/>
                                           </p:stCondLst>
@@ -24947,14 +24914,14 @@
                                 </p:cTn>
                               </p:par>
                               <p:par>
-                                <p:cTn id="63" presetID="1" presetClass="entr" presetSubtype="0" fill="hold" grpId="0" nodeType="withEffect">
+                                <p:cTn id="61" presetID="1" presetClass="entr" presetSubtype="0" fill="hold" grpId="0" nodeType="withEffect">
                                   <p:stCondLst>
                                     <p:cond delay="0"/>
                                   </p:stCondLst>
                                   <p:childTnLst>
                                     <p:set>
                                       <p:cBhvr>
-                                        <p:cTn id="64" dur="1" fill="hold">
+                                        <p:cTn id="62" dur="1" fill="hold">
                                           <p:stCondLst>
                                             <p:cond delay="0"/>
                                           </p:stCondLst>
@@ -24980,26 +24947,26 @@
                     </p:cTn>
                   </p:par>
                   <p:par>
-                    <p:cTn id="65" fill="hold">
+                    <p:cTn id="63" fill="hold">
                       <p:stCondLst>
                         <p:cond delay="indefinite"/>
                       </p:stCondLst>
                       <p:childTnLst>
                         <p:par>
-                          <p:cTn id="66" fill="hold">
+                          <p:cTn id="64" fill="hold">
                             <p:stCondLst>
                               <p:cond delay="0"/>
                             </p:stCondLst>
                             <p:childTnLst>
                               <p:par>
-                                <p:cTn id="67" presetID="1" presetClass="entr" presetSubtype="0" fill="hold" grpId="0" nodeType="clickEffect">
+                                <p:cTn id="65" presetID="1" presetClass="entr" presetSubtype="0" fill="hold" grpId="0" nodeType="clickEffect">
                                   <p:stCondLst>
                                     <p:cond delay="0"/>
                                   </p:stCondLst>
                                   <p:childTnLst>
                                     <p:set>
                                       <p:cBhvr>
-                                        <p:cTn id="68" dur="1" fill="hold">
+                                        <p:cTn id="66" dur="1" fill="hold">
                                           <p:stCondLst>
                                             <p:cond delay="0"/>
                                           </p:stCondLst>
@@ -25018,15 +24985,24 @@
                                   </p:childTnLst>
                                 </p:cTn>
                               </p:par>
+                            </p:childTnLst>
+                          </p:cTn>
+                        </p:par>
+                        <p:par>
+                          <p:cTn id="67" fill="hold">
+                            <p:stCondLst>
+                              <p:cond delay="0"/>
+                            </p:stCondLst>
+                            <p:childTnLst>
                               <p:par>
-                                <p:cTn id="69" presetID="1" presetClass="entr" presetSubtype="0" fill="hold" grpId="0" nodeType="withEffect">
+                                <p:cTn id="68" presetID="1" presetClass="entr" presetSubtype="0" fill="hold" grpId="0" nodeType="afterEffect">
                                   <p:stCondLst>
                                     <p:cond delay="0"/>
                                   </p:stCondLst>
                                   <p:childTnLst>
                                     <p:set>
                                       <p:cBhvr>
-                                        <p:cTn id="70" dur="1" fill="hold">
+                                        <p:cTn id="69" dur="1" fill="hold">
                                           <p:stCondLst>
                                             <p:cond delay="0"/>
                                           </p:stCondLst>
@@ -25042,6 +25018,59 @@
                                         <p:strVal val="visible"/>
                                       </p:to>
                                     </p:set>
+                                  </p:childTnLst>
+                                </p:cTn>
+                              </p:par>
+                            </p:childTnLst>
+                          </p:cTn>
+                        </p:par>
+                      </p:childTnLst>
+                    </p:cTn>
+                  </p:par>
+                  <p:par>
+                    <p:cTn id="70" fill="hold">
+                      <p:stCondLst>
+                        <p:cond delay="indefinite"/>
+                      </p:stCondLst>
+                      <p:childTnLst>
+                        <p:par>
+                          <p:cTn id="71" fill="hold">
+                            <p:stCondLst>
+                              <p:cond delay="0"/>
+                            </p:stCondLst>
+                            <p:childTnLst>
+                              <p:par>
+                                <p:cTn id="72" presetID="16" presetClass="entr" presetSubtype="21" fill="hold" nodeType="clickEffect">
+                                  <p:stCondLst>
+                                    <p:cond delay="0"/>
+                                  </p:stCondLst>
+                                  <p:childTnLst>
+                                    <p:set>
+                                      <p:cBhvr>
+                                        <p:cTn id="73" dur="1" fill="hold">
+                                          <p:stCondLst>
+                                            <p:cond delay="0"/>
+                                          </p:stCondLst>
+                                        </p:cTn>
+                                        <p:tgtEl>
+                                          <p:spTgt spid="1026"/>
+                                        </p:tgtEl>
+                                        <p:attrNameLst>
+                                          <p:attrName>style.visibility</p:attrName>
+                                        </p:attrNameLst>
+                                      </p:cBhvr>
+                                      <p:to>
+                                        <p:strVal val="visible"/>
+                                      </p:to>
+                                    </p:set>
+                                    <p:animEffect transition="in" filter="barn(inVertical)">
+                                      <p:cBhvr>
+                                        <p:cTn id="74" dur="500"/>
+                                        <p:tgtEl>
+                                          <p:spTgt spid="1026"/>
+                                        </p:tgtEl>
+                                      </p:cBhvr>
+                                    </p:animEffect>
                                   </p:childTnLst>
                                 </p:cTn>
                               </p:par>
@@ -29016,7 +29045,7 @@
         </p:nvSpPr>
         <p:spPr>
           <a:xfrm>
-            <a:off x="4064635" y="2066290"/>
+            <a:off x="3832024" y="2031682"/>
             <a:ext cx="4058920" cy="3990340"/>
           </a:xfrm>
           <a:prstGeom prst="ellipse">

</xml_diff>